<commit_message>
Update some literature review
</commit_message>
<xml_diff>
--- a/doc/lightning_talk.pptx
+++ b/doc/lightning_talk.pptx
@@ -109,6 +109,11 @@
       </a:defRPr>
     </a:lvl9pPr>
   </p:defaultTextStyle>
+  <p:extLst>
+    <p:ext uri="{EFAFB233-063F-42B5-8137-9DF3F51BA10A}">
+      <p15:sldGuideLst xmlns:p15="http://schemas.microsoft.com/office/powerpoint/2012/main"/>
+    </p:ext>
+  </p:extLst>
 </p:presentation>
 </file>
 
@@ -3685,8 +3690,8 @@
           </a:p>
         </p:txBody>
       </p:sp>
-      <mc:AlternateContent xmlns:mc="http://schemas.openxmlformats.org/markup-compatibility/2006">
-        <mc:Choice xmlns:a14="http://schemas.microsoft.com/office/drawing/2010/main" Requires="a14">
+      <mc:AlternateContent xmlns:mc="http://schemas.openxmlformats.org/markup-compatibility/2006" xmlns:a14="http://schemas.microsoft.com/office/drawing/2010/main">
+        <mc:Choice Requires="a14">
           <p:sp>
             <p:nvSpPr>
               <p:cNvPr id="3" name="Content Placeholder 2">
@@ -3798,7 +3803,7 @@
             </p:txBody>
           </p:sp>
         </mc:Choice>
-        <mc:Fallback>
+        <mc:Fallback xmlns="">
           <p:sp>
             <p:nvSpPr>
               <p:cNvPr id="3" name="Content Placeholder 2">
@@ -4384,20 +4389,26 @@
           <a:p>
             <a:r>
               <a:rPr lang="en-US" dirty="0"/>
-              <a:t>Mainstream algorithm does not seem to support time-dependent routing</a:t>
+              <a:t>Mainstream algorithm is a black box to me</a:t>
             </a:r>
           </a:p>
           <a:p>
             <a:pPr lvl="1"/>
             <a:r>
               <a:rPr lang="en-US" dirty="0"/>
-              <a:t>If they do, please tell me, e.g. open trip planner</a:t>
+              <a:t>If they do support time-dependent routing, please tell me, e.g. open trip planner</a:t>
             </a:r>
           </a:p>
           <a:p>
             <a:r>
               <a:rPr lang="en-US" dirty="0"/>
               <a:t>Much more flexible for scientific calculation</a:t>
+            </a:r>
+          </a:p>
+          <a:p>
+            <a:r>
+              <a:rPr lang="en-US" dirty="0"/>
+              <a:t>Support for achieved real-time data</a:t>
             </a:r>
           </a:p>
           <a:p>

</xml_diff>